<commit_message>
IDE 08 neue Lizenzen eingepflegt
</commit_message>
<xml_diff>
--- a/training-cards/music moves/Ideas (IDE)/ger/apprentice/ger_IDE_08_Ideen_einfangen_MM_A.pptx
+++ b/training-cards/music moves/Ideas (IDE)/ger/apprentice/ger_IDE_08_Ideen_einfangen_MM_A.pptx
@@ -512,14 +512,20 @@
       </p:pic>
       <p:sp>
         <p:nvSpPr>
-          <p:cNvPr id="5" name="Shape 7"/>
+          <p:cNvPr id="4" name="Shape 7">
+            <a:extLst>
+              <a:ext uri="{FF2B5EF4-FFF2-40B4-BE49-F238E27FC236}">
+                <a16:creationId xmlns:a16="http://schemas.microsoft.com/office/drawing/2014/main" id="{6B704224-73A3-9DBD-1873-E262203BCAE0}"/>
+              </a:ext>
+            </a:extLst>
+          </p:cNvPr>
           <p:cNvSpPr/>
           <p:nvPr userDrawn="1"/>
         </p:nvSpPr>
         <p:spPr>
           <a:xfrm>
-            <a:off x="1683417" y="4952581"/>
-            <a:ext cx="4196016" cy="276995"/>
+            <a:off x="971550" y="4689585"/>
+            <a:ext cx="4691860" cy="461661"/>
           </a:xfrm>
           <a:prstGeom prst="rect">
             <a:avLst/>
@@ -529,12 +535,12 @@
           </a:ln>
           <a:extLst>
             <a:ext uri="{C572A759-6A51-4108-AA02-DFA0A04FC94B}">
-              <ma14:wrappingTextBoxFlag xmlns:ma14="http://schemas.microsoft.com/office/mac/drawingml/2011/main" xmlns="" val="1"/>
+              <ma14:wrappingTextBoxFlag xmlns="" xmlns:ma14="http://schemas.microsoft.com/office/mac/drawingml/2011/main" val="1"/>
             </a:ext>
           </a:extLst>
         </p:spPr>
         <p:txBody>
-          <a:bodyPr wrap="none" lIns="45718" tIns="45718" rIns="45718" bIns="45718">
+          <a:bodyPr wrap="square" lIns="45718" tIns="45718" rIns="45718" bIns="45718">
             <a:spAutoFit/>
           </a:bodyPr>
           <a:lstStyle/>
@@ -543,47 +549,266 @@
               <a:defRPr sz="1800"/>
             </a:pPr>
             <a:r>
-              <a:rPr sz="600" dirty="0">
-                <a:latin typeface="Avenir Light"/>
+              <a:rPr lang="de-DE" sz="800" b="0" i="0" u="none" strike="noStrike" dirty="0" err="1">
+                <a:solidFill>
+                  <a:schemeClr val="tx1">
+                    <a:lumMod val="65000"/>
+                    <a:lumOff val="35000"/>
+                  </a:schemeClr>
+                </a:solidFill>
+                <a:effectLst/>
+                <a:latin typeface="Avenir Book" panose="02000503020000020003" pitchFamily="2" charset="0"/>
+              </a:rPr>
+              <a:t>music</a:t>
+            </a:r>
+            <a:r>
+              <a:rPr lang="de-DE" sz="800" b="0" i="0" u="none" strike="noStrike" dirty="0">
+                <a:solidFill>
+                  <a:schemeClr val="tx1">
+                    <a:lumMod val="65000"/>
+                    <a:lumOff val="35000"/>
+                  </a:schemeClr>
+                </a:solidFill>
+                <a:effectLst/>
+                <a:latin typeface="Avenir Book" panose="02000503020000020003" pitchFamily="2" charset="0"/>
+              </a:rPr>
+              <a:t> </a:t>
+            </a:r>
+            <a:r>
+              <a:rPr lang="de-DE" sz="800" b="0" i="0" u="none" strike="noStrike" dirty="0" err="1">
+                <a:solidFill>
+                  <a:schemeClr val="tx1">
+                    <a:lumMod val="65000"/>
+                    <a:lumOff val="35000"/>
+                  </a:schemeClr>
+                </a:solidFill>
+                <a:effectLst/>
+                <a:latin typeface="Avenir Book" panose="02000503020000020003" pitchFamily="2" charset="0"/>
+              </a:rPr>
+              <a:t>moves</a:t>
+            </a:r>
+            <a:r>
+              <a:rPr lang="de-DE" sz="800" b="0" i="0" u="none" strike="noStrike" dirty="0">
+                <a:solidFill>
+                  <a:schemeClr val="tx1">
+                    <a:lumMod val="65000"/>
+                    <a:lumOff val="35000"/>
+                  </a:schemeClr>
+                </a:solidFill>
+                <a:effectLst/>
+                <a:latin typeface="Avenir Book" panose="02000503020000020003" pitchFamily="2" charset="0"/>
+              </a:rPr>
+              <a:t>-Trainingskarten von Regina Brandhuber sind lizenziert unter einer Creative Commons </a:t>
+            </a:r>
+          </a:p>
+          <a:p>
+            <a:pPr lvl="0" algn="ctr">
+              <a:defRPr sz="1800"/>
+            </a:pPr>
+            <a:r>
+              <a:rPr lang="de-DE" sz="800" b="0" i="0" u="none" strike="noStrike" dirty="0">
+                <a:solidFill>
+                  <a:schemeClr val="tx1">
+                    <a:lumMod val="65000"/>
+                    <a:lumOff val="35000"/>
+                  </a:schemeClr>
+                </a:solidFill>
+                <a:effectLst/>
+                <a:latin typeface="Avenir Book" panose="02000503020000020003" pitchFamily="2" charset="0"/>
+              </a:rPr>
+              <a:t>Namensnennung-Nicht kommerziell 4.0 International Lizenz.</a:t>
+            </a:r>
+          </a:p>
+          <a:p>
+            <a:pPr lvl="0" algn="ctr">
+              <a:defRPr sz="1800"/>
+            </a:pPr>
+            <a:r>
+              <a:rPr lang="de-DE" sz="800" dirty="0">
+                <a:solidFill>
+                  <a:schemeClr val="tx1">
+                    <a:lumMod val="65000"/>
+                    <a:lumOff val="35000"/>
+                  </a:schemeClr>
+                </a:solidFill>
+                <a:latin typeface="Avenir Book" panose="02000503020000020003" pitchFamily="2" charset="0"/>
                 <a:ea typeface="Calibri"/>
                 <a:cs typeface="Avenir Light"/>
                 <a:sym typeface="Calibri"/>
               </a:rPr>
-              <a:t>This work is licensed under the Creative Commons Attribution-NonCommercial-NoDerivatives 4.0 International License. </a:t>
-            </a:r>
-          </a:p>
-          <a:p>
-            <a:pPr lvl="0" algn="ctr">
-              <a:defRPr sz="1800"/>
-            </a:pPr>
-            <a:r>
-              <a:rPr sz="600" dirty="0">
-                <a:latin typeface="Avenir Light"/>
+              <a:t>Nachzulesen unter:</a:t>
+            </a:r>
+            <a:r>
+              <a:rPr sz="800" dirty="0">
+                <a:solidFill>
+                  <a:schemeClr val="tx1">
+                    <a:lumMod val="65000"/>
+                    <a:lumOff val="35000"/>
+                  </a:schemeClr>
+                </a:solidFill>
+                <a:latin typeface="Avenir Book" panose="02000503020000020003" pitchFamily="2" charset="0"/>
                 <a:ea typeface="Calibri"/>
                 <a:cs typeface="Avenir Light"/>
                 <a:sym typeface="Calibri"/>
               </a:rPr>
-              <a:t>To view a copy of this license, visit http://creativecommons.org/licenses/by-nc-nd/4.0/.</a:t>
-            </a:r>
+              <a:t> </a:t>
+            </a:r>
+            <a:r>
+              <a:rPr lang="de-DE" sz="800" dirty="0">
+                <a:solidFill>
+                  <a:schemeClr val="tx1">
+                    <a:lumMod val="65000"/>
+                    <a:lumOff val="35000"/>
+                  </a:schemeClr>
+                </a:solidFill>
+                <a:latin typeface="Avenir Book" panose="02000503020000020003" pitchFamily="2" charset="0"/>
+                <a:ea typeface="Calibri"/>
+                <a:cs typeface="Avenir Light"/>
+                <a:sym typeface="Calibri"/>
+              </a:rPr>
+              <a:t>https://</a:t>
+            </a:r>
+            <a:r>
+              <a:rPr lang="de-DE" sz="800" dirty="0" err="1">
+                <a:solidFill>
+                  <a:schemeClr val="tx1">
+                    <a:lumMod val="65000"/>
+                    <a:lumOff val="35000"/>
+                  </a:schemeClr>
+                </a:solidFill>
+                <a:latin typeface="Avenir Book" panose="02000503020000020003" pitchFamily="2" charset="0"/>
+                <a:ea typeface="Calibri"/>
+                <a:cs typeface="Avenir Light"/>
+                <a:sym typeface="Calibri"/>
+              </a:rPr>
+              <a:t>creativecommons.org</a:t>
+            </a:r>
+            <a:r>
+              <a:rPr lang="de-DE" sz="800" dirty="0">
+                <a:solidFill>
+                  <a:schemeClr val="tx1">
+                    <a:lumMod val="65000"/>
+                    <a:lumOff val="35000"/>
+                  </a:schemeClr>
+                </a:solidFill>
+                <a:latin typeface="Avenir Book" panose="02000503020000020003" pitchFamily="2" charset="0"/>
+                <a:ea typeface="Calibri"/>
+                <a:cs typeface="Avenir Light"/>
+                <a:sym typeface="Calibri"/>
+              </a:rPr>
+              <a:t>/</a:t>
+            </a:r>
+            <a:r>
+              <a:rPr lang="de-DE" sz="800" dirty="0" err="1">
+                <a:solidFill>
+                  <a:schemeClr val="tx1">
+                    <a:lumMod val="65000"/>
+                    <a:lumOff val="35000"/>
+                  </a:schemeClr>
+                </a:solidFill>
+                <a:latin typeface="Avenir Book" panose="02000503020000020003" pitchFamily="2" charset="0"/>
+                <a:ea typeface="Calibri"/>
+                <a:cs typeface="Avenir Light"/>
+                <a:sym typeface="Calibri"/>
+              </a:rPr>
+              <a:t>licenses</a:t>
+            </a:r>
+            <a:r>
+              <a:rPr lang="de-DE" sz="800" dirty="0">
+                <a:solidFill>
+                  <a:schemeClr val="tx1">
+                    <a:lumMod val="65000"/>
+                    <a:lumOff val="35000"/>
+                  </a:schemeClr>
+                </a:solidFill>
+                <a:latin typeface="Avenir Book" panose="02000503020000020003" pitchFamily="2" charset="0"/>
+                <a:ea typeface="Calibri"/>
+                <a:cs typeface="Avenir Light"/>
+                <a:sym typeface="Calibri"/>
+              </a:rPr>
+              <a:t>/</a:t>
+            </a:r>
+            <a:r>
+              <a:rPr lang="de-DE" sz="800" dirty="0" err="1">
+                <a:solidFill>
+                  <a:schemeClr val="tx1">
+                    <a:lumMod val="65000"/>
+                    <a:lumOff val="35000"/>
+                  </a:schemeClr>
+                </a:solidFill>
+                <a:latin typeface="Avenir Book" panose="02000503020000020003" pitchFamily="2" charset="0"/>
+                <a:ea typeface="Calibri"/>
+                <a:cs typeface="Avenir Light"/>
+                <a:sym typeface="Calibri"/>
+              </a:rPr>
+              <a:t>by-nc</a:t>
+            </a:r>
+            <a:r>
+              <a:rPr lang="de-DE" sz="800" dirty="0">
+                <a:solidFill>
+                  <a:schemeClr val="tx1">
+                    <a:lumMod val="65000"/>
+                    <a:lumOff val="35000"/>
+                  </a:schemeClr>
+                </a:solidFill>
+                <a:latin typeface="Avenir Book" panose="02000503020000020003" pitchFamily="2" charset="0"/>
+                <a:ea typeface="Calibri"/>
+                <a:cs typeface="Avenir Light"/>
+                <a:sym typeface="Calibri"/>
+              </a:rPr>
+              <a:t>/4.0/</a:t>
+            </a:r>
+            <a:r>
+              <a:rPr lang="de-DE" sz="800" dirty="0" err="1">
+                <a:solidFill>
+                  <a:schemeClr val="tx1">
+                    <a:lumMod val="65000"/>
+                    <a:lumOff val="35000"/>
+                  </a:schemeClr>
+                </a:solidFill>
+                <a:latin typeface="Avenir Book" panose="02000503020000020003" pitchFamily="2" charset="0"/>
+                <a:ea typeface="Calibri"/>
+                <a:cs typeface="Avenir Light"/>
+                <a:sym typeface="Calibri"/>
+              </a:rPr>
+              <a:t>deed.de</a:t>
+            </a:r>
+            <a:endParaRPr sz="800" dirty="0">
+              <a:solidFill>
+                <a:schemeClr val="tx1">
+                  <a:lumMod val="65000"/>
+                  <a:lumOff val="35000"/>
+                </a:schemeClr>
+              </a:solidFill>
+              <a:latin typeface="Avenir Book" panose="02000503020000020003" pitchFamily="2" charset="0"/>
+              <a:ea typeface="Calibri"/>
+              <a:cs typeface="Avenir Light"/>
+              <a:sym typeface="Calibri"/>
+            </a:endParaRPr>
           </a:p>
         </p:txBody>
       </p:sp>
       <p:pic>
         <p:nvPicPr>
-          <p:cNvPr id="6" name="pasted-image.tif"/>
+          <p:cNvPr id="8" name="pasted-image.tif">
+            <a:extLst>
+              <a:ext uri="{FF2B5EF4-FFF2-40B4-BE49-F238E27FC236}">
+                <a16:creationId xmlns:a16="http://schemas.microsoft.com/office/drawing/2014/main" id="{6CEDB8F7-5B63-AA43-2EF3-7738B927D6F6}"/>
+              </a:ext>
+            </a:extLst>
+          </p:cNvPr>
           <p:cNvPicPr/>
           <p:nvPr userDrawn="1"/>
         </p:nvPicPr>
-        <p:blipFill>
+        <p:blipFill rotWithShape="1">
           <a:blip r:embed="rId4"/>
-          <a:stretch>
-            <a:fillRect/>
-          </a:stretch>
+          <a:srcRect r="24777" b="-3233"/>
+          <a:stretch/>
         </p:blipFill>
         <p:spPr>
           <a:xfrm>
-            <a:off x="6174185" y="4992838"/>
-            <a:ext cx="886619" cy="214128"/>
+            <a:off x="5724347" y="4733926"/>
+            <a:ext cx="1009828" cy="333374"/>
           </a:xfrm>
           <a:prstGeom prst="rect">
             <a:avLst/>
@@ -593,58 +818,6 @@
           </a:ln>
         </p:spPr>
       </p:pic>
-      <p:sp>
-        <p:nvSpPr>
-          <p:cNvPr id="7" name="Textfeld 6"/>
-          <p:cNvSpPr txBox="1"/>
-          <p:nvPr userDrawn="1"/>
-        </p:nvSpPr>
-        <p:spPr>
-          <a:xfrm>
-            <a:off x="239285" y="4936890"/>
-            <a:ext cx="1044856" cy="276999"/>
-          </a:xfrm>
-          <a:prstGeom prst="rect">
-            <a:avLst/>
-          </a:prstGeom>
-          <a:noFill/>
-        </p:spPr>
-        <p:txBody>
-          <a:bodyPr wrap="square" rtlCol="0">
-            <a:spAutoFit/>
-          </a:bodyPr>
-          <a:lstStyle/>
-          <a:p>
-            <a:r>
-              <a:rPr lang="de-DE" sz="600" dirty="0">
-                <a:solidFill>
-                  <a:srgbClr val="5D5E5F"/>
-                </a:solidFill>
-                <a:latin typeface="Avenir Light"/>
-                <a:cs typeface="Avenir Light"/>
-              </a:rPr>
-              <a:t>Letzte Änderung: </a:t>
-            </a:r>
-            <a:fld id="{7A8C7DAC-E536-564C-B5B3-90E8FAB50562}" type="datetime1">
-              <a:rPr lang="de-DE" sz="600" smtClean="0">
-                <a:solidFill>
-                  <a:srgbClr val="5D5E5F"/>
-                </a:solidFill>
-                <a:latin typeface="Avenir Light"/>
-                <a:cs typeface="Avenir Light"/>
-              </a:rPr>
-              <a:t>19.07.23</a:t>
-            </a:fld>
-            <a:endParaRPr lang="de-DE" sz="600" dirty="0">
-              <a:solidFill>
-                <a:srgbClr val="5D5E5F"/>
-              </a:solidFill>
-              <a:latin typeface="Avenir Light"/>
-              <a:cs typeface="Avenir Light"/>
-            </a:endParaRPr>
-          </a:p>
-        </p:txBody>
-      </p:sp>
     </p:spTree>
     <p:extLst>
       <p:ext uri="{BB962C8B-B14F-4D97-AF65-F5344CB8AC3E}">
@@ -714,7 +887,7 @@
           <a:p>
             <a:fld id="{FF5B2BAF-DF38-0A48-A798-0C06E514FD52}" type="datetimeFigureOut">
               <a:rPr lang="de-DE" smtClean="0"/>
-              <a:t>19.07.23</a:t>
+              <a:t>27.07.23</a:t>
             </a:fld>
             <a:endParaRPr lang="de-DE" dirty="0"/>
           </a:p>
@@ -934,7 +1107,7 @@
           <a:p>
             <a:fld id="{FF5B2BAF-DF38-0A48-A798-0C06E514FD52}" type="datetimeFigureOut">
               <a:rPr lang="de-DE" smtClean="0"/>
-              <a:t>19.07.23</a:t>
+              <a:t>27.07.23</a:t>
             </a:fld>
             <a:endParaRPr lang="de-DE" dirty="0"/>
           </a:p>

</xml_diff>

<commit_message>
IDE 8,9,13,14 Literatur und Blocksatz
</commit_message>
<xml_diff>
--- a/training-cards/music moves/Ideas (IDE)/ger/apprentice/ger_IDE_08_Ideen_einfangen_MM_A.pptx
+++ b/training-cards/music moves/Ideas (IDE)/ger/apprentice/ger_IDE_08_Ideen_einfangen_MM_A.pptx
@@ -535,7 +535,7 @@
           </a:ln>
           <a:extLst>
             <a:ext uri="{C572A759-6A51-4108-AA02-DFA0A04FC94B}">
-              <ma14:wrappingTextBoxFlag xmlns="" xmlns:ma14="http://schemas.microsoft.com/office/mac/drawingml/2011/main" val="1"/>
+              <ma14:wrappingTextBoxFlag xmlns:ma14="http://schemas.microsoft.com/office/mac/drawingml/2011/main" xmlns="" val="1"/>
             </a:ext>
           </a:extLst>
         </p:spPr>
@@ -887,7 +887,7 @@
           <a:p>
             <a:fld id="{FF5B2BAF-DF38-0A48-A798-0C06E514FD52}" type="datetimeFigureOut">
               <a:rPr lang="de-DE" smtClean="0"/>
-              <a:t>27.07.23</a:t>
+              <a:t>30.07.24</a:t>
             </a:fld>
             <a:endParaRPr lang="de-DE" dirty="0"/>
           </a:p>
@@ -1107,7 +1107,7 @@
           <a:p>
             <a:fld id="{FF5B2BAF-DF38-0A48-A798-0C06E514FD52}" type="datetimeFigureOut">
               <a:rPr lang="de-DE" smtClean="0"/>
-              <a:t>27.07.23</a:t>
+              <a:t>30.07.24</a:t>
             </a:fld>
             <a:endParaRPr lang="de-DE" dirty="0"/>
           </a:p>
@@ -1775,48 +1775,159 @@
             <p:ph idx="13"/>
           </p:nvPr>
         </p:nvSpPr>
-        <p:spPr/>
+        <p:spPr>
+          <a:xfrm>
+            <a:off x="858838" y="1568452"/>
+            <a:ext cx="6011545" cy="3536948"/>
+          </a:xfrm>
+        </p:spPr>
         <p:txBody>
           <a:bodyPr>
             <a:noAutofit/>
           </a:bodyPr>
           <a:lstStyle/>
           <a:p>
+            <a:pPr algn="just"/>
+            <a:r>
+              <a:rPr lang="de-DE" sz="1100" dirty="0"/>
+              <a:t>Jeder hat Ideen. Sie müssen oftmals nur freigelegt werden. Sie aufzuschreiben hilft dabei Ideen auszuhärten und wirklich werden zu lassen. </a:t>
+            </a:r>
+          </a:p>
+          <a:p>
+            <a:pPr algn="just"/>
+            <a:r>
+              <a:rPr lang="de-DE" sz="1100" dirty="0"/>
+              <a:t>Eine Möglichkeit, für einen physischen Ort ist eine Ideenwand oder ein Ideenbuch. Virtuell können Ideen in diversen Apps gesammelt werden. Wichtig ist dabei, dass der Platz für die Ideen zentral ist in Deinem Alltag, z.B. in der Handtasche oder in einem Zimmer, in dem Du oft bist. </a:t>
+            </a:r>
+          </a:p>
+          <a:p>
+            <a:pPr algn="just"/>
+            <a:r>
+              <a:rPr lang="de-DE" sz="1100" dirty="0"/>
+              <a:t>Wenn Du Deine Ideen an einer Wand visualisieren möchtest, ist es praktisch einen Teil der Wand (z.B. Post </a:t>
+            </a:r>
+            <a:r>
+              <a:rPr lang="de-DE" sz="1100" dirty="0" err="1"/>
+              <a:t>Its</a:t>
+            </a:r>
+            <a:r>
+              <a:rPr lang="de-DE" sz="1100" dirty="0"/>
+              <a:t>) immer dabei zu haben. Ideen können schnell verfliegen. Man sollte sie zu jeder Zeit schnell aufschreiben können.</a:t>
+            </a:r>
+          </a:p>
+          <a:p>
+            <a:pPr algn="just"/>
+            <a:r>
+              <a:rPr lang="de-DE" sz="1100" dirty="0"/>
+              <a:t>Vorbild für einen Ort im Alltag ist das „</a:t>
+            </a:r>
+            <a:r>
+              <a:rPr lang="de-DE" sz="1100" dirty="0" err="1"/>
+              <a:t>Product</a:t>
+            </a:r>
+            <a:r>
+              <a:rPr lang="de-DE" sz="1100" dirty="0"/>
+              <a:t> Backlog“ (Sutherland/</a:t>
+            </a:r>
+            <a:r>
+              <a:rPr lang="de-DE" sz="1100" dirty="0" err="1"/>
+              <a:t>Schwaber</a:t>
+            </a:r>
+            <a:r>
+              <a:rPr lang="de-DE" sz="1100" dirty="0"/>
+              <a:t> 2020, S. 11) aus der Softwareentwicklung (siehe auch SCR 10). Es kann als Container für Ideen verwendet werden. </a:t>
+            </a:r>
+          </a:p>
+          <a:p>
+            <a:pPr algn="just"/>
+            <a:r>
+              <a:rPr lang="de-DE" sz="1100" dirty="0"/>
+              <a:t>Dein Ideen-Backlog kannst Du immer wieder durch Brainstorming speisen. Bei dieser Technik ist es wichtig, Dir vorher eine konkrete Fragestellung zu überlegen und so viele Ideen wie möglich zuzulassen, denen Du ohne Bewertung, auch wenn sie wild sind, einen Platz gibst.</a:t>
+            </a:r>
+          </a:p>
+          <a:p>
+            <a:pPr marL="0" indent="0">
+              <a:buNone/>
+            </a:pPr>
+            <a:endParaRPr lang="de-DE" sz="800" dirty="0"/>
+          </a:p>
+          <a:p>
+            <a:pPr marL="0" indent="0">
+              <a:buNone/>
+            </a:pPr>
+            <a:r>
+              <a:rPr lang="de-DE" sz="800" dirty="0"/>
+              <a:t>Quellen:	 </a:t>
+            </a:r>
+            <a:r>
+              <a:rPr lang="de-DE" sz="800" b="1" dirty="0" err="1"/>
+              <a:t>Schwaber</a:t>
+            </a:r>
+            <a:r>
+              <a:rPr lang="de-DE" sz="800" dirty="0"/>
+              <a:t>, Ken/Sutherland, Jeff (2020): Der </a:t>
+            </a:r>
+            <a:r>
+              <a:rPr lang="de-DE" sz="800" dirty="0" err="1"/>
+              <a:t>Scrum</a:t>
+            </a:r>
+            <a:r>
+              <a:rPr lang="de-DE" sz="800" dirty="0"/>
+              <a:t> Guide. Der gültige Leitfaden für </a:t>
+            </a:r>
+            <a:r>
+              <a:rPr lang="de-DE" sz="800" dirty="0" err="1"/>
+              <a:t>Scrum</a:t>
+            </a:r>
+            <a:r>
+              <a:rPr lang="de-DE" sz="800" dirty="0"/>
+              <a:t>: Die Spielregeln. 	</a:t>
+            </a:r>
+            <a:br>
+              <a:rPr lang="de-DE" sz="800" dirty="0"/>
+            </a:br>
+            <a:r>
+              <a:rPr lang="de-DE" sz="800" dirty="0"/>
+              <a:t>                    http://</a:t>
+            </a:r>
+            <a:r>
+              <a:rPr lang="de-DE" sz="800" dirty="0" err="1"/>
+              <a:t>scrumguides.org</a:t>
+            </a:r>
+            <a:r>
+              <a:rPr lang="de-DE" sz="800" dirty="0"/>
+              <a:t>/</a:t>
+            </a:r>
+            <a:r>
+              <a:rPr lang="de-DE" sz="800" dirty="0" err="1"/>
+              <a:t>docs</a:t>
+            </a:r>
+            <a:r>
+              <a:rPr lang="de-DE" sz="800" dirty="0"/>
+              <a:t>/</a:t>
+            </a:r>
+            <a:r>
+              <a:rPr lang="de-DE" sz="800" dirty="0" err="1"/>
+              <a:t>scrumguide</a:t>
+            </a:r>
+            <a:r>
+              <a:rPr lang="de-DE" sz="800" dirty="0"/>
+              <a:t>/v2020/2020-Scrum-Guide-German.pdf. Abgerufen am 25. Juli 2024</a:t>
+            </a:r>
+          </a:p>
+          <a:p>
+            <a:pPr marL="0" indent="0" algn="just">
+              <a:buNone/>
+            </a:pPr>
+            <a:endParaRPr lang="de-DE" sz="800" dirty="0"/>
+          </a:p>
+          <a:p>
+            <a:pPr marL="0" indent="0" algn="just">
+              <a:buNone/>
+            </a:pPr>
             <a:r>
               <a:rPr lang="de-DE" dirty="0"/>
-              <a:t>Jeder hat Ideen. Sie müssen oftmals nur freigelegt werden. Sie aufzuschreiben hilft dabei Ideen auszuhärten und wirklich werden zu lassen. </a:t>
-            </a:r>
-          </a:p>
-          <a:p>
-            <a:r>
-              <a:rPr lang="de-DE" dirty="0"/>
-              <a:t>Eine Möglichkeit, für einen physischen Ort ist eine Ideenwand oder ein Ideenbuch. Virtuell können Ideen in diversen Apps gesammelt werden. Wichtig ist dabei, dass der Platz für die Ideen, einen zentralen Platz im Alltag einnehmen kann, z.B. in der Handtasche oder in einem Zimmer, in dem Du oft bist. </a:t>
-            </a:r>
-          </a:p>
-          <a:p>
-            <a:r>
-              <a:rPr lang="de-DE" dirty="0"/>
-              <a:t>Wenn Du Deine Ideen an einer Wand visualisieren möchtest, ist es praktisch einen Teil der Wand (z.B. Post </a:t>
-            </a:r>
-            <a:r>
-              <a:rPr lang="de-DE" dirty="0" err="1"/>
-              <a:t>Its</a:t>
-            </a:r>
-            <a:r>
-              <a:rPr lang="de-DE" dirty="0"/>
-              <a:t>) immer dabei zu haben. Ideen können schnell verfliegen. Man sollte sie zu jeder Zeit schnell einfangen können.</a:t>
-            </a:r>
-          </a:p>
-          <a:p>
-            <a:r>
-              <a:rPr lang="de-DE" dirty="0"/>
-              <a:t>Vorbild für diesen Platz ist das Backlog aus der Softwareentwicklung (siehe auch SCR 10). Es soll hier als Container für Ideen verwendet werden. </a:t>
-            </a:r>
-          </a:p>
-          <a:p>
-            <a:r>
-              <a:rPr lang="de-DE" dirty="0"/>
-              <a:t>Dein Ideen-Backlog kannst Du immer wieder durch Brainstorming speisen. Bei dieser Technik ist es wichtig, Dir vorher eine konkrete Fragestellung zu überlegen und so viele Ideen wie möglich zuzulassen, weil Du ohne Bewertung auch den wildesten Ideen Platz gibst.	</a:t>
+              <a:t>	</a:t>
             </a:r>
           </a:p>
         </p:txBody>
@@ -1888,28 +1999,28 @@
         </p:nvSpPr>
         <p:spPr/>
         <p:txBody>
-          <a:bodyPr/>
+          <a:bodyPr>
+            <a:normAutofit/>
+          </a:bodyPr>
           <a:lstStyle/>
           <a:p>
-            <a:r>
-              <a:rPr lang="de-DE" dirty="0"/>
-              <a:t>Bestimme einen physischen Ort für Deine Ideen, an dem du oft bist, oder wähle ein Medium das du mit dir nehmen kannst.</a:t>
-            </a:r>
-          </a:p>
-          <a:p>
-            <a:r>
-              <a:rPr lang="de-DE" dirty="0"/>
+            <a:pPr algn="just"/>
+            <a:r>
+              <a:rPr lang="de-DE" sz="1200" dirty="0"/>
+              <a:t>Bestimme einen physischen Ort für Deine Ideen, an dem Du oft bist, oder wähle ein Medium, das Du mit Dir nehmen kannst.</a:t>
+            </a:r>
+          </a:p>
+          <a:p>
+            <a:pPr algn="just"/>
+            <a:r>
+              <a:rPr lang="de-DE" sz="1200" dirty="0"/>
               <a:t>Erweitere Dein Ideenmedium in 2 Wochen mit 8 Notizen. Wenn Dir keine neuen Ideen einfallen, fülle den freien Platz mit Informationen, z. B. zu was Du Ideen haben möchtest, oder welche Ideen es dazu bereits gibt.</a:t>
             </a:r>
           </a:p>
           <a:p>
             <a:r>
-              <a:rPr lang="de-DE"/>
-              <a:t>Zeige Dein </a:t>
-            </a:r>
-            <a:r>
-              <a:rPr lang="de-DE" dirty="0"/>
-              <a:t>Material Deinem Team.</a:t>
+              <a:rPr lang="de-DE" sz="1200" dirty="0"/>
+              <a:t>Zeige Dein Material Deinem Team.</a:t>
             </a:r>
           </a:p>
         </p:txBody>

</xml_diff>

<commit_message>
IDE 08 Rechtschreibfehler, Quelle hinzugefügt
</commit_message>
<xml_diff>
--- a/training-cards/music moves/Ideas (IDE)/ger/apprentice/ger_IDE_08_Ideen_einfangen_MM_A.pptx
+++ b/training-cards/music moves/Ideas (IDE)/ger/apprentice/ger_IDE_08_Ideen_einfangen_MM_A.pptx
@@ -535,7 +535,7 @@
           </a:ln>
           <a:extLst>
             <a:ext uri="{C572A759-6A51-4108-AA02-DFA0A04FC94B}">
-              <ma14:wrappingTextBoxFlag xmlns:ma14="http://schemas.microsoft.com/office/mac/drawingml/2011/main" xmlns="" val="1"/>
+              <ma14:wrappingTextBoxFlag xmlns="" xmlns:ma14="http://schemas.microsoft.com/office/mac/drawingml/2011/main" val="1"/>
             </a:ext>
           </a:extLst>
         </p:spPr>
@@ -887,7 +887,7 @@
           <a:p>
             <a:fld id="{FF5B2BAF-DF38-0A48-A798-0C06E514FD52}" type="datetimeFigureOut">
               <a:rPr lang="de-DE" smtClean="0"/>
-              <a:t>30.07.24</a:t>
+              <a:t>10.03.25</a:t>
             </a:fld>
             <a:endParaRPr lang="de-DE" dirty="0"/>
           </a:p>
@@ -1107,7 +1107,7 @@
           <a:p>
             <a:fld id="{FF5B2BAF-DF38-0A48-A798-0C06E514FD52}" type="datetimeFigureOut">
               <a:rPr lang="de-DE" smtClean="0"/>
-              <a:t>30.07.24</a:t>
+              <a:t>10.03.25</a:t>
             </a:fld>
             <a:endParaRPr lang="de-DE" dirty="0"/>
           </a:p>
@@ -1804,11 +1804,11 @@
             <a:pPr algn="just"/>
             <a:r>
               <a:rPr lang="de-DE" sz="1100" dirty="0"/>
-              <a:t>Wenn Du Deine Ideen an einer Wand visualisieren möchtest, ist es praktisch einen Teil der Wand (z.B. Post </a:t>
+              <a:t>Wenn Du Deine Ideen an einer Wand visualisieren möchtest, ist es praktisch einen Teil der Wand (z.B. Post-</a:t>
             </a:r>
             <a:r>
               <a:rPr lang="de-DE" sz="1100" dirty="0" err="1"/>
-              <a:t>Its</a:t>
+              <a:t>its</a:t>
             </a:r>
             <a:r>
               <a:rPr lang="de-DE" sz="1100" dirty="0"/>
@@ -1842,7 +1842,36 @@
             <a:pPr algn="just"/>
             <a:r>
               <a:rPr lang="de-DE" sz="1100" dirty="0"/>
-              <a:t>Dein Ideen-Backlog kannst Du immer wieder durch Brainstorming speisen. Bei dieser Technik ist es wichtig, Dir vorher eine konkrete Fragestellung zu überlegen und so viele Ideen wie möglich zuzulassen, denen Du ohne Bewertung, auch wenn sie wild sind, einen Platz gibst.</a:t>
+              <a:t>Dein Ideen-Backlog kannst Du immer wieder durch Brainstorming speisen. Bei dieser Technik ist es wichtig, Dir vorher eine konkrete Fragestellung zu überlegen und so viele Ideen wie möglich zuzulassen, denen Du ohne Bewertung, auch wenn sie wild sind, einen Platz gibst (</a:t>
+            </a:r>
+            <a:r>
+              <a:rPr lang="de-DE" sz="1100" dirty="0" err="1">
+                <a:effectLst/>
+                <a:latin typeface="Avenir Book" panose="02000503020000020003" pitchFamily="2" charset="0"/>
+                <a:ea typeface="Calibri" panose="020F0502020204030204" pitchFamily="34" charset="0"/>
+                <a:cs typeface="Times New Roman" panose="02020603050405020304" pitchFamily="18" charset="0"/>
+              </a:rPr>
+              <a:t>Uebernickel</a:t>
+            </a:r>
+            <a:r>
+              <a:rPr lang="de-DE" sz="1100" dirty="0">
+                <a:effectLst/>
+                <a:latin typeface="Avenir Book" panose="02000503020000020003" pitchFamily="2" charset="0"/>
+                <a:ea typeface="Calibri" panose="020F0502020204030204" pitchFamily="34" charset="0"/>
+                <a:cs typeface="Times New Roman" panose="02020603050405020304" pitchFamily="18" charset="0"/>
+              </a:rPr>
+              <a:t> u. a. 2015, S. 138)</a:t>
+            </a:r>
+            <a:r>
+              <a:rPr lang="de-DE" sz="1100" dirty="0">
+                <a:effectLst/>
+                <a:latin typeface="Avenir Book" panose="02000503020000020003" pitchFamily="2" charset="0"/>
+              </a:rPr>
+              <a:t> </a:t>
+            </a:r>
+            <a:r>
+              <a:rPr lang="de-DE" sz="1100" dirty="0"/>
+              <a:t>.</a:t>
             </a:r>
           </a:p>
           <a:p>
@@ -1919,7 +1948,49 @@
             <a:pPr marL="0" indent="0" algn="just">
               <a:buNone/>
             </a:pPr>
-            <a:endParaRPr lang="de-DE" sz="800" dirty="0"/>
+            <a:r>
+              <a:rPr lang="de-DE" sz="800" dirty="0"/>
+              <a:t>	</a:t>
+            </a:r>
+            <a:r>
+              <a:rPr lang="de-DE" sz="800" b="1" dirty="0" err="1"/>
+              <a:t>Ubernickel</a:t>
+            </a:r>
+            <a:r>
+              <a:rPr lang="de-DE" sz="800" dirty="0"/>
+              <a:t>, Falk/Brenner, Walter/</a:t>
+            </a:r>
+            <a:r>
+              <a:rPr lang="de-DE" sz="800" dirty="0" err="1"/>
+              <a:t>Pukall</a:t>
+            </a:r>
+            <a:r>
+              <a:rPr lang="de-DE" sz="800" dirty="0"/>
+              <a:t>, Britta u.a. (2015): Design </a:t>
+            </a:r>
+            <a:r>
+              <a:rPr lang="de-DE" sz="800" dirty="0" err="1"/>
+              <a:t>Thinking</a:t>
+            </a:r>
+            <a:r>
+              <a:rPr lang="de-DE" sz="800" dirty="0"/>
+              <a:t>. Das Handbuch. Frankfurt am Main: </a:t>
+            </a:r>
+            <a:br>
+              <a:rPr lang="de-DE" sz="800" dirty="0"/>
+            </a:br>
+            <a:r>
+              <a:rPr lang="de-DE" sz="800" dirty="0"/>
+              <a:t>	     Frankfurter </a:t>
+            </a:r>
+            <a:r>
+              <a:rPr lang="de-DE" sz="800" dirty="0" err="1"/>
+              <a:t>Societäts</a:t>
+            </a:r>
+            <a:r>
+              <a:rPr lang="de-DE" sz="800" dirty="0"/>
+              <a:t>-Medien</a:t>
+            </a:r>
           </a:p>
           <a:p>
             <a:pPr marL="0" indent="0" algn="just">

</xml_diff>